<commit_message>
Edit OSI 7 layers
</commit_message>
<xml_diff>
--- a/osi-and-tcp.pptx
+++ b/osi-and-tcp.pptx
@@ -104,6 +104,11 @@
       </a:defRPr>
     </a:lvl9pPr>
   </p:defaultTextStyle>
+  <p:extLst>
+    <p:ext uri="{EFAFB233-063F-42B5-8137-9DF3F51BA10A}">
+      <p15:sldGuideLst xmlns:p15="http://schemas.microsoft.com/office/powerpoint/2012/main"/>
+    </p:ext>
+  </p:extLst>
 </p:presentation>
 </file>
 
@@ -254,7 +259,7 @@
           <a:p>
             <a:fld id="{26677419-F1F3-734A-A990-44807245426F}" type="datetimeFigureOut">
               <a:rPr kumimoji="1" lang="ko-KR" altLang="en-US" smtClean="0"/>
-              <a:t>2020. 7. 12.</a:t>
+              <a:t>2020. 7. 21.</a:t>
             </a:fld>
             <a:endParaRPr kumimoji="1" lang="ko-KR" altLang="en-US"/>
           </a:p>
@@ -452,7 +457,7 @@
           <a:p>
             <a:fld id="{26677419-F1F3-734A-A990-44807245426F}" type="datetimeFigureOut">
               <a:rPr kumimoji="1" lang="ko-KR" altLang="en-US" smtClean="0"/>
-              <a:t>2020. 7. 12.</a:t>
+              <a:t>2020. 7. 21.</a:t>
             </a:fld>
             <a:endParaRPr kumimoji="1" lang="ko-KR" altLang="en-US"/>
           </a:p>
@@ -660,7 +665,7 @@
           <a:p>
             <a:fld id="{26677419-F1F3-734A-A990-44807245426F}" type="datetimeFigureOut">
               <a:rPr kumimoji="1" lang="ko-KR" altLang="en-US" smtClean="0"/>
-              <a:t>2020. 7. 12.</a:t>
+              <a:t>2020. 7. 21.</a:t>
             </a:fld>
             <a:endParaRPr kumimoji="1" lang="ko-KR" altLang="en-US"/>
           </a:p>
@@ -858,7 +863,7 @@
           <a:p>
             <a:fld id="{26677419-F1F3-734A-A990-44807245426F}" type="datetimeFigureOut">
               <a:rPr kumimoji="1" lang="ko-KR" altLang="en-US" smtClean="0"/>
-              <a:t>2020. 7. 12.</a:t>
+              <a:t>2020. 7. 21.</a:t>
             </a:fld>
             <a:endParaRPr kumimoji="1" lang="ko-KR" altLang="en-US"/>
           </a:p>
@@ -1133,7 +1138,7 @@
           <a:p>
             <a:fld id="{26677419-F1F3-734A-A990-44807245426F}" type="datetimeFigureOut">
               <a:rPr kumimoji="1" lang="ko-KR" altLang="en-US" smtClean="0"/>
-              <a:t>2020. 7. 12.</a:t>
+              <a:t>2020. 7. 21.</a:t>
             </a:fld>
             <a:endParaRPr kumimoji="1" lang="ko-KR" altLang="en-US"/>
           </a:p>
@@ -1398,7 +1403,7 @@
           <a:p>
             <a:fld id="{26677419-F1F3-734A-A990-44807245426F}" type="datetimeFigureOut">
               <a:rPr kumimoji="1" lang="ko-KR" altLang="en-US" smtClean="0"/>
-              <a:t>2020. 7. 12.</a:t>
+              <a:t>2020. 7. 21.</a:t>
             </a:fld>
             <a:endParaRPr kumimoji="1" lang="ko-KR" altLang="en-US"/>
           </a:p>
@@ -1810,7 +1815,7 @@
           <a:p>
             <a:fld id="{26677419-F1F3-734A-A990-44807245426F}" type="datetimeFigureOut">
               <a:rPr kumimoji="1" lang="ko-KR" altLang="en-US" smtClean="0"/>
-              <a:t>2020. 7. 12.</a:t>
+              <a:t>2020. 7. 21.</a:t>
             </a:fld>
             <a:endParaRPr kumimoji="1" lang="ko-KR" altLang="en-US"/>
           </a:p>
@@ -1951,7 +1956,7 @@
           <a:p>
             <a:fld id="{26677419-F1F3-734A-A990-44807245426F}" type="datetimeFigureOut">
               <a:rPr kumimoji="1" lang="ko-KR" altLang="en-US" smtClean="0"/>
-              <a:t>2020. 7. 12.</a:t>
+              <a:t>2020. 7. 21.</a:t>
             </a:fld>
             <a:endParaRPr kumimoji="1" lang="ko-KR" altLang="en-US"/>
           </a:p>
@@ -2064,7 +2069,7 @@
           <a:p>
             <a:fld id="{26677419-F1F3-734A-A990-44807245426F}" type="datetimeFigureOut">
               <a:rPr kumimoji="1" lang="ko-KR" altLang="en-US" smtClean="0"/>
-              <a:t>2020. 7. 12.</a:t>
+              <a:t>2020. 7. 21.</a:t>
             </a:fld>
             <a:endParaRPr kumimoji="1" lang="ko-KR" altLang="en-US"/>
           </a:p>
@@ -2375,7 +2380,7 @@
           <a:p>
             <a:fld id="{26677419-F1F3-734A-A990-44807245426F}" type="datetimeFigureOut">
               <a:rPr kumimoji="1" lang="ko-KR" altLang="en-US" smtClean="0"/>
-              <a:t>2020. 7. 12.</a:t>
+              <a:t>2020. 7. 21.</a:t>
             </a:fld>
             <a:endParaRPr kumimoji="1" lang="ko-KR" altLang="en-US"/>
           </a:p>
@@ -2663,7 +2668,7 @@
           <a:p>
             <a:fld id="{26677419-F1F3-734A-A990-44807245426F}" type="datetimeFigureOut">
               <a:rPr kumimoji="1" lang="ko-KR" altLang="en-US" smtClean="0"/>
-              <a:t>2020. 7. 12.</a:t>
+              <a:t>2020. 7. 21.</a:t>
             </a:fld>
             <a:endParaRPr kumimoji="1" lang="ko-KR" altLang="en-US"/>
           </a:p>
@@ -2904,7 +2909,7 @@
           <a:p>
             <a:fld id="{26677419-F1F3-734A-A990-44807245426F}" type="datetimeFigureOut">
               <a:rPr kumimoji="1" lang="ko-KR" altLang="en-US" smtClean="0"/>
-              <a:t>2020. 7. 12.</a:t>
+              <a:t>2020. 7. 21.</a:t>
             </a:fld>
             <a:endParaRPr kumimoji="1" lang="ko-KR" altLang="en-US"/>
           </a:p>
@@ -3336,7 +3341,7 @@
           <p:nvPr>
             <p:extLst>
               <p:ext uri="{D42A27DB-BD31-4B8C-83A1-F6EECF244321}">
-                <p14:modId xmlns:p14="http://schemas.microsoft.com/office/powerpoint/2010/main" val="3590997484"/>
+                <p14:modId xmlns:p14="http://schemas.microsoft.com/office/powerpoint/2010/main" val="1892246305"/>
               </p:ext>
             </p:extLst>
           </p:nvPr>
@@ -3505,7 +3510,7 @@
                   </a:txBody>
                   <a:tcPr/>
                 </a:tc>
-                <a:tc>
+                <a:tc rowSpan="3">
                   <a:txBody>
                     <a:bodyPr/>
                     <a:lstStyle/>
@@ -3513,7 +3518,11 @@
                       <a:pPr algn="ctr" latinLnBrk="1"/>
                       <a:r>
                         <a:rPr lang="en-US" altLang="ko-KR" dirty="0"/>
-                        <a:t>7</a:t>
+                        <a:t>L7</a:t>
+                      </a:r>
+                      <a:r>
+                        <a:rPr lang="en-US" altLang="ko-KR"/>
+                        <a:t>(firewall, IDS , IPS)</a:t>
                       </a:r>
                       <a:endParaRPr lang="ko-KR" altLang="en-US" dirty="0"/>
                     </a:p>
@@ -3631,16 +3640,12 @@
                   </a:txBody>
                   <a:tcPr/>
                 </a:tc>
-                <a:tc>
+                <a:tc vMerge="1">
                   <a:txBody>
                     <a:bodyPr/>
                     <a:lstStyle/>
                     <a:p>
                       <a:pPr algn="ctr" latinLnBrk="1"/>
-                      <a:r>
-                        <a:rPr lang="en-US" altLang="ko-KR" dirty="0"/>
-                        <a:t>6</a:t>
-                      </a:r>
                       <a:endParaRPr lang="ko-KR" altLang="en-US" dirty="0"/>
                     </a:p>
                   </a:txBody>
@@ -3713,16 +3718,12 @@
                   </a:txBody>
                   <a:tcPr/>
                 </a:tc>
-                <a:tc>
+                <a:tc vMerge="1">
                   <a:txBody>
                     <a:bodyPr/>
                     <a:lstStyle/>
                     <a:p>
                       <a:pPr algn="ctr" latinLnBrk="1"/>
-                      <a:r>
-                        <a:rPr lang="en-US" altLang="ko-KR" dirty="0"/>
-                        <a:t>5</a:t>
-                      </a:r>
                       <a:endParaRPr lang="ko-KR" altLang="en-US" dirty="0"/>
                     </a:p>
                   </a:txBody>
@@ -3803,7 +3804,7 @@
                       <a:pPr algn="ctr" latinLnBrk="1"/>
                       <a:r>
                         <a:rPr lang="en-US" altLang="ko-KR" dirty="0"/>
-                        <a:t>4</a:t>
+                        <a:t>L4(NAT)</a:t>
                       </a:r>
                       <a:endParaRPr lang="ko-KR" altLang="en-US" dirty="0"/>
                     </a:p>
@@ -3901,7 +3902,7 @@
                       <a:pPr algn="ctr" latinLnBrk="1"/>
                       <a:r>
                         <a:rPr lang="en-US" altLang="ko-KR" dirty="0"/>
-                        <a:t>3</a:t>
+                        <a:t>L3(router)</a:t>
                       </a:r>
                       <a:endParaRPr lang="ko-KR" altLang="en-US" dirty="0"/>
                     </a:p>
@@ -3999,7 +4000,7 @@
                       <a:pPr algn="ctr" latinLnBrk="1"/>
                       <a:r>
                         <a:rPr lang="en-US" altLang="ko-KR" dirty="0"/>
-                        <a:t>2</a:t>
+                        <a:t>L2(switch)</a:t>
                       </a:r>
                       <a:endParaRPr lang="ko-KR" altLang="en-US" dirty="0"/>
                     </a:p>
@@ -4104,7 +4105,7 @@
                       <a:pPr algn="ctr" latinLnBrk="1"/>
                       <a:r>
                         <a:rPr lang="en-US" altLang="ko-KR" dirty="0"/>
-                        <a:t>1</a:t>
+                        <a:t>L1</a:t>
                       </a:r>
                       <a:endParaRPr lang="ko-KR" altLang="en-US" dirty="0"/>
                     </a:p>

</xml_diff>